<commit_message>
Update 2dgp 2016180056 정태주 3차.pptx
ppt 수정
</commit_message>
<xml_diff>
--- a/2dgp 2016180056 정태주 3차.pptx
+++ b/2dgp 2016180056 정태주 3차.pptx
@@ -2,7 +2,7 @@
 <file path=ppt/presentation.xml><?xml version="1.0" encoding="utf-8"?>
 <p:presentation xmlns:a="http://schemas.openxmlformats.org/drawingml/2006/main" xmlns:r="http://schemas.openxmlformats.org/officeDocument/2006/relationships" xmlns:p="http://schemas.openxmlformats.org/presentationml/2006/main" xmlns:p14="http://schemas.microsoft.com/office/powerpoint/2010/main" saveSubsetFonts="1">
   <p:sldMasterIdLst>
-    <p:sldMasterId id="2147483739" r:id="rId13"/>
+    <p:sldMasterId id="2147483743" r:id="rId13"/>
   </p:sldMasterIdLst>
   <p:notesMasterIdLst>
     <p:notesMasterId r:id="rId17"/>
@@ -12,8 +12,8 @@
   </p:handoutMasterIdLst>
   <p:sldIdLst>
     <p:sldId id="256" r:id="rId19"/>
-    <p:sldId id="261" r:id="rId20"/>
-    <p:sldId id="262" r:id="rId21"/>
+    <p:sldId id="261" r:id="rId21"/>
+    <p:sldId id="262" r:id="rId22"/>
   </p:sldIdLst>
   <p:sldSz cx="12192000" cy="6858000"/>
   <p:notesSz cx="6858000" cy="9144000"/>
@@ -8506,35 +8506,6 @@
           </a:p>
         </p:txBody>
       </p:sp>
-      <p:pic>
-        <p:nvPicPr>
-          <p:cNvPr id="3" name="그림 2" descr="C:/Users/stevie/AppData/Roaming/PolarisOffice/ETemp/26356_9614968/fImage28584809891.png"/>
-          <p:cNvPicPr>
-            <a:picLocks noChangeAspect="1"/>
-          </p:cNvPicPr>
-          <p:nvPr/>
-        </p:nvPicPr>
-        <p:blipFill rotWithShape="1">
-          <a:blip r:embed="rId1" cstate="print">
-            <a:extLst>
-              <a:ext uri="{28A0092B-C50C-407E-A947-70E740481C1C}">
-                <a14:useLocalDpi xmlns:a14="http://schemas.microsoft.com/office/drawing/2010/main" val="0"/>
-              </a:ext>
-            </a:extLst>
-          </a:blip>
-          <a:stretch>
-            <a:fillRect/>
-          </a:stretch>
-        </p:blipFill>
-        <p:spPr>
-          <a:xfrm rot="0">
-            <a:off x="497205" y="680720"/>
-            <a:ext cx="9046845" cy="2484755"/>
-          </a:xfrm>
-          <a:prstGeom prst="rect"/>
-          <a:noFill/>
-        </p:spPr>
-      </p:pic>
       <p:graphicFrame>
         <p:nvGraphicFramePr>
           <p:cNvPr id="4" name="표 3"/>
@@ -9263,7 +9234,7 @@
                           <a:latin typeface="맑은 고딕" charset="0"/>
                           <a:ea typeface="맑은 고딕" charset="0"/>
                         </a:rPr>
-                        <a:t>6</a:t>
+                        <a:t>7</a:t>
                       </a:r>
                       <a:endParaRPr lang="ko-KR" altLang="en-US" sz="1400" kern="1200" i="0" b="0">
                         <a:solidFill>
@@ -9281,6 +9252,35 @@
           </a:graphicData>
         </a:graphic>
       </p:graphicFrame>
+      <p:pic>
+        <p:nvPicPr>
+          <p:cNvPr id="5" name="그림 4" descr="C:/Users/stevie/AppData/Roaming/PolarisOffice/ETemp/26408_24076712/fImage2983350406.png"/>
+          <p:cNvPicPr>
+            <a:picLocks noChangeAspect="1"/>
+          </p:cNvPicPr>
+          <p:nvPr/>
+        </p:nvPicPr>
+        <p:blipFill rotWithShape="1">
+          <a:blip r:embed="rId2" cstate="print">
+            <a:extLst>
+              <a:ext uri="{28A0092B-C50C-407E-A947-70E740481C1C}">
+                <a14:useLocalDpi xmlns:a14="http://schemas.microsoft.com/office/drawing/2010/main" val="0"/>
+              </a:ext>
+            </a:extLst>
+          </a:blip>
+          <a:stretch>
+            <a:fillRect/>
+          </a:stretch>
+        </p:blipFill>
+        <p:spPr>
+          <a:xfrm rot="0">
+            <a:off x="741680" y="618490"/>
+            <a:ext cx="9883775" cy="2858135"/>
+          </a:xfrm>
+          <a:prstGeom prst="rect"/>
+          <a:noFill/>
+        </p:spPr>
+      </p:pic>
     </p:spTree>
   </p:cSld>
   <p:clrMapOvr>

</xml_diff>